<commit_message>
Updated My Portfolio Website.pptx
</commit_message>
<xml_diff>
--- a/My Portfolio Website.pptx
+++ b/My Portfolio Website.pptx
@@ -13,6 +13,7 @@
     <p:sldId id="258" r:id="rId8"/>
     <p:sldId id="259" r:id="rId9"/>
     <p:sldId id="260" r:id="rId10"/>
+    <p:sldId id="261" r:id="rId11"/>
   </p:sldIdLst>
   <p:sldSz cy="5143500" cx="9144000"/>
   <p:notesSz cx="6858000" cy="9144000"/>
@@ -893,7 +894,7 @@
   <p:cSld>
     <p:spTree>
       <p:nvGrpSpPr>
-        <p:cNvPr id="61" name="Shape 61"/>
+        <p:cNvPr id="62" name="Shape 62"/>
         <p:cNvGrpSpPr/>
         <p:nvPr/>
       </p:nvGrpSpPr>
@@ -907,7 +908,7 @@
       </p:grpSpPr>
       <p:sp>
         <p:nvSpPr>
-          <p:cNvPr id="62" name="Google Shape;62;g229c8d03334_0_8:notes"/>
+          <p:cNvPr id="63" name="Google Shape;63;g229c8d03334_0_8:notes"/>
           <p:cNvSpPr/>
           <p:nvPr>
             <p:ph idx="2" type="sldImg"/>
@@ -942,7 +943,7 @@
       </p:sp>
       <p:sp>
         <p:nvSpPr>
-          <p:cNvPr id="63" name="Google Shape;63;g229c8d03334_0_8:notes"/>
+          <p:cNvPr id="64" name="Google Shape;64;g229c8d03334_0_8:notes"/>
           <p:cNvSpPr txBox="1"/>
           <p:nvPr>
             <p:ph idx="1" type="body"/>
@@ -992,7 +993,7 @@
   <p:cSld>
     <p:spTree>
       <p:nvGrpSpPr>
-        <p:cNvPr id="67" name="Shape 67"/>
+        <p:cNvPr id="68" name="Shape 68"/>
         <p:cNvGrpSpPr/>
         <p:nvPr/>
       </p:nvGrpSpPr>
@@ -1006,7 +1007,7 @@
       </p:grpSpPr>
       <p:sp>
         <p:nvSpPr>
-          <p:cNvPr id="68" name="Google Shape;68;g229c8d03334_0_14:notes"/>
+          <p:cNvPr id="69" name="Google Shape;69;g229c8d03334_0_14:notes"/>
           <p:cNvSpPr/>
           <p:nvPr>
             <p:ph idx="2" type="sldImg"/>
@@ -1041,7 +1042,7 @@
       </p:sp>
       <p:sp>
         <p:nvSpPr>
-          <p:cNvPr id="69" name="Google Shape;69;g229c8d03334_0_14:notes"/>
+          <p:cNvPr id="70" name="Google Shape;70;g229c8d03334_0_14:notes"/>
           <p:cNvSpPr txBox="1"/>
           <p:nvPr>
             <p:ph idx="1" type="body"/>
@@ -1091,7 +1092,7 @@
   <p:cSld>
     <p:spTree>
       <p:nvGrpSpPr>
-        <p:cNvPr id="73" name="Shape 73"/>
+        <p:cNvPr id="74" name="Shape 74"/>
         <p:cNvGrpSpPr/>
         <p:nvPr/>
       </p:nvGrpSpPr>
@@ -1105,7 +1106,7 @@
       </p:grpSpPr>
       <p:sp>
         <p:nvSpPr>
-          <p:cNvPr id="74" name="Google Shape;74;g229c8d03334_0_22:notes"/>
+          <p:cNvPr id="75" name="Google Shape;75;g229c8d03334_0_22:notes"/>
           <p:cNvSpPr/>
           <p:nvPr>
             <p:ph idx="2" type="sldImg"/>
@@ -1140,7 +1141,106 @@
       </p:sp>
       <p:sp>
         <p:nvSpPr>
-          <p:cNvPr id="75" name="Google Shape;75;g229c8d03334_0_22:notes"/>
+          <p:cNvPr id="76" name="Google Shape;76;g229c8d03334_0_22:notes"/>
+          <p:cNvSpPr txBox="1"/>
+          <p:nvPr>
+            <p:ph idx="1" type="body"/>
+          </p:nvPr>
+        </p:nvSpPr>
+        <p:spPr>
+          <a:xfrm>
+            <a:off x="685800" y="4343400"/>
+            <a:ext cx="5486400" cy="4114800"/>
+          </a:xfrm>
+          <a:prstGeom prst="rect">
+            <a:avLst/>
+          </a:prstGeom>
+        </p:spPr>
+        <p:txBody>
+          <a:bodyPr anchorCtr="0" anchor="t" bIns="91425" lIns="91425" spcFirstLastPara="1" rIns="91425" wrap="square" tIns="91425">
+            <a:noAutofit/>
+          </a:bodyPr>
+          <a:lstStyle/>
+          <a:p>
+            <a:pPr indent="0" lvl="0" marL="0" rtl="0" algn="l">
+              <a:spcBef>
+                <a:spcPts val="0"/>
+              </a:spcBef>
+              <a:spcAft>
+                <a:spcPts val="0"/>
+              </a:spcAft>
+              <a:buNone/>
+            </a:pPr>
+            <a:r>
+              <a:t/>
+            </a:r>
+            <a:endParaRPr/>
+          </a:p>
+        </p:txBody>
+      </p:sp>
+    </p:spTree>
+  </p:cSld>
+  <p:clrMapOvr>
+    <a:masterClrMapping/>
+  </p:clrMapOvr>
+</p:notes>
+</file>
+
+<file path=ppt/notesSlides/notesSlide6.xml><?xml version="1.0" encoding="utf-8"?>
+<p:notes xmlns:a="http://schemas.openxmlformats.org/drawingml/2006/main" xmlns:r="http://schemas.openxmlformats.org/officeDocument/2006/relationships" xmlns:mc="http://schemas.openxmlformats.org/markup-compatibility/2006" xmlns:mv="urn:schemas-microsoft-com:mac:vml" xmlns:p="http://schemas.openxmlformats.org/presentationml/2006/main" xmlns:c="http://schemas.openxmlformats.org/drawingml/2006/chart" xmlns:dgm="http://schemas.openxmlformats.org/drawingml/2006/diagram" xmlns:o="urn:schemas-microsoft-com:office:office" xmlns:v="urn:schemas-microsoft-com:vml" xmlns:pvml="urn:schemas-microsoft-com:office:powerpoint" xmlns:com="http://schemas.openxmlformats.org/drawingml/2006/compatibility" xmlns:p14="http://schemas.microsoft.com/office/powerpoint/2010/main" xmlns:p15="http://schemas.microsoft.com/office/powerpoint/2012/main" xmlns:ahyp="http://schemas.microsoft.com/office/drawing/2018/hyperlinkcolor" showMasterPhAnim="0" showMasterSp="0">
+  <p:cSld>
+    <p:spTree>
+      <p:nvGrpSpPr>
+        <p:cNvPr id="80" name="Shape 80"/>
+        <p:cNvGrpSpPr/>
+        <p:nvPr/>
+      </p:nvGrpSpPr>
+      <p:grpSpPr>
+        <a:xfrm>
+          <a:off x="0" y="0"/>
+          <a:ext cx="0" cy="0"/>
+          <a:chOff x="0" y="0"/>
+          <a:chExt cx="0" cy="0"/>
+        </a:xfrm>
+      </p:grpSpPr>
+      <p:sp>
+        <p:nvSpPr>
+          <p:cNvPr id="81" name="Google Shape;81;g229c8d03334_0_34:notes"/>
+          <p:cNvSpPr/>
+          <p:nvPr>
+            <p:ph idx="2" type="sldImg"/>
+          </p:nvPr>
+        </p:nvSpPr>
+        <p:spPr>
+          <a:xfrm>
+            <a:off x="381300" y="685800"/>
+            <a:ext cx="6096000" cy="3429000"/>
+          </a:xfrm>
+          <a:custGeom>
+            <a:rect b="b" l="l" r="r" t="t"/>
+            <a:pathLst>
+              <a:path extrusionOk="0" h="120000" w="120000">
+                <a:moveTo>
+                  <a:pt x="0" y="0"/>
+                </a:moveTo>
+                <a:lnTo>
+                  <a:pt x="120000" y="0"/>
+                </a:lnTo>
+                <a:lnTo>
+                  <a:pt x="120000" y="120000"/>
+                </a:lnTo>
+                <a:lnTo>
+                  <a:pt x="0" y="120000"/>
+                </a:lnTo>
+                <a:close/>
+              </a:path>
+            </a:pathLst>
+          </a:custGeom>
+        </p:spPr>
+      </p:sp>
+      <p:sp>
+        <p:nvSpPr>
+          <p:cNvPr id="82" name="Google Shape;82;g229c8d03334_0_34:notes"/>
           <p:cNvSpPr txBox="1"/>
           <p:nvPr>
             <p:ph idx="1" type="body"/>
@@ -5996,7 +6096,7 @@
         </p:nvSpPr>
         <p:spPr>
           <a:xfrm>
-            <a:off x="311708" y="744575"/>
+            <a:off x="311708" y="342150"/>
             <a:ext cx="8520600" cy="2052600"/>
           </a:xfrm>
           <a:prstGeom prst="rect">
@@ -6038,6 +6138,83 @@
               <a:t/>
             </a:r>
             <a:endParaRPr/>
+          </a:p>
+        </p:txBody>
+      </p:sp>
+      <p:sp>
+        <p:nvSpPr>
+          <p:cNvPr id="61" name="Google Shape;61;p14"/>
+          <p:cNvSpPr txBox="1"/>
+          <p:nvPr/>
+        </p:nvSpPr>
+        <p:spPr>
+          <a:xfrm>
+            <a:off x="456900" y="1948350"/>
+            <a:ext cx="8375400" cy="1246800"/>
+          </a:xfrm>
+          <a:prstGeom prst="rect">
+            <a:avLst/>
+          </a:prstGeom>
+          <a:noFill/>
+          <a:ln>
+            <a:noFill/>
+          </a:ln>
+        </p:spPr>
+        <p:txBody>
+          <a:bodyPr anchorCtr="0" anchor="t" bIns="91425" lIns="91425" spcFirstLastPara="1" rIns="91425" wrap="square" tIns="91425">
+            <a:spAutoFit/>
+          </a:bodyPr>
+          <a:lstStyle/>
+          <a:p>
+            <a:pPr indent="-374650" lvl="0" marL="457200" rtl="0" algn="l">
+              <a:spcBef>
+                <a:spcPts val="0"/>
+              </a:spcBef>
+              <a:spcAft>
+                <a:spcPts val="0"/>
+              </a:spcAft>
+              <a:buSzPts val="2300"/>
+              <a:buChar char="-"/>
+            </a:pPr>
+            <a:r>
+              <a:rPr lang="en-GB" sz="2300"/>
+              <a:t>Sitemap</a:t>
+            </a:r>
+            <a:endParaRPr sz="2300"/>
+          </a:p>
+          <a:p>
+            <a:pPr indent="-374650" lvl="0" marL="457200" rtl="0" algn="l">
+              <a:spcBef>
+                <a:spcPts val="0"/>
+              </a:spcBef>
+              <a:spcAft>
+                <a:spcPts val="0"/>
+              </a:spcAft>
+              <a:buSzPts val="2300"/>
+              <a:buChar char="-"/>
+            </a:pPr>
+            <a:r>
+              <a:rPr lang="en-GB" sz="2300"/>
+              <a:t>Wireframe</a:t>
+            </a:r>
+            <a:endParaRPr sz="2300"/>
+          </a:p>
+          <a:p>
+            <a:pPr indent="-374650" lvl="0" marL="457200" rtl="0" algn="l">
+              <a:spcBef>
+                <a:spcPts val="0"/>
+              </a:spcBef>
+              <a:spcAft>
+                <a:spcPts val="0"/>
+              </a:spcAft>
+              <a:buSzPts val="2300"/>
+              <a:buChar char="-"/>
+            </a:pPr>
+            <a:r>
+              <a:rPr lang="en-GB" sz="2300"/>
+              <a:t>Components</a:t>
+            </a:r>
+            <a:endParaRPr sz="2300"/>
           </a:p>
         </p:txBody>
       </p:sp>
@@ -6069,7 +6246,7 @@
     </p:bg>
     <p:spTree>
       <p:nvGrpSpPr>
-        <p:cNvPr id="64" name="Shape 64"/>
+        <p:cNvPr id="65" name="Shape 65"/>
         <p:cNvGrpSpPr/>
         <p:nvPr/>
       </p:nvGrpSpPr>
@@ -6083,7 +6260,7 @@
       </p:grpSpPr>
       <p:sp>
         <p:nvSpPr>
-          <p:cNvPr id="65" name="Google Shape;65;p15"/>
+          <p:cNvPr id="66" name="Google Shape;66;p15"/>
           <p:cNvSpPr txBox="1"/>
           <p:nvPr>
             <p:ph type="ctrTitle"/>
@@ -6138,7 +6315,7 @@
       </p:sp>
       <p:pic>
         <p:nvPicPr>
-          <p:cNvPr id="66" name="Google Shape;66;p15"/>
+          <p:cNvPr id="67" name="Google Shape;67;p15"/>
           <p:cNvPicPr preferRelativeResize="0"/>
           <p:nvPr/>
         </p:nvPicPr>
@@ -6192,7 +6369,7 @@
     </p:bg>
     <p:spTree>
       <p:nvGrpSpPr>
-        <p:cNvPr id="70" name="Shape 70"/>
+        <p:cNvPr id="71" name="Shape 71"/>
         <p:cNvGrpSpPr/>
         <p:nvPr/>
       </p:nvGrpSpPr>
@@ -6206,7 +6383,7 @@
       </p:grpSpPr>
       <p:sp>
         <p:nvSpPr>
-          <p:cNvPr id="71" name="Google Shape;71;p16"/>
+          <p:cNvPr id="72" name="Google Shape;72;p16"/>
           <p:cNvSpPr txBox="1"/>
           <p:nvPr>
             <p:ph type="ctrTitle"/>
@@ -6261,7 +6438,7 @@
       </p:sp>
       <p:sp>
         <p:nvSpPr>
-          <p:cNvPr id="72" name="Google Shape;72;p16"/>
+          <p:cNvPr id="73" name="Google Shape;73;p16"/>
           <p:cNvSpPr txBox="1"/>
           <p:nvPr>
             <p:ph idx="1" type="subTitle"/>
@@ -6327,7 +6504,7 @@
     </p:bg>
     <p:spTree>
       <p:nvGrpSpPr>
-        <p:cNvPr id="76" name="Shape 76"/>
+        <p:cNvPr id="77" name="Shape 77"/>
         <p:cNvGrpSpPr/>
         <p:nvPr/>
       </p:nvGrpSpPr>
@@ -6341,7 +6518,7 @@
       </p:grpSpPr>
       <p:sp>
         <p:nvSpPr>
-          <p:cNvPr id="77" name="Google Shape;77;p17"/>
+          <p:cNvPr id="78" name="Google Shape;78;p17"/>
           <p:cNvSpPr txBox="1"/>
           <p:nvPr>
             <p:ph type="ctrTitle"/>
@@ -6400,7 +6577,7 @@
       </p:sp>
       <p:sp>
         <p:nvSpPr>
-          <p:cNvPr id="78" name="Google Shape;78;p17"/>
+          <p:cNvPr id="79" name="Google Shape;79;p17"/>
           <p:cNvSpPr txBox="1"/>
           <p:nvPr>
             <p:ph idx="1" type="subTitle"/>
@@ -6421,7 +6598,7 @@
           </a:bodyPr>
           <a:lstStyle/>
           <a:p>
-            <a:pPr indent="-379730" lvl="0" marL="457200" rtl="0" algn="ctr">
+            <a:pPr indent="-379730" lvl="0" marL="457200" rtl="0" algn="l">
               <a:spcBef>
                 <a:spcPts val="0"/>
               </a:spcBef>
@@ -6438,7 +6615,7 @@
             <a:endParaRPr/>
           </a:p>
           <a:p>
-            <a:pPr indent="-379730" lvl="0" marL="457200" rtl="0" algn="ctr">
+            <a:pPr indent="-379730" lvl="0" marL="457200" rtl="0" algn="l">
               <a:spcBef>
                 <a:spcPts val="0"/>
               </a:spcBef>
@@ -6455,7 +6632,7 @@
             <a:endParaRPr/>
           </a:p>
           <a:p>
-            <a:pPr indent="-379730" lvl="0" marL="457200" rtl="0" algn="ctr">
+            <a:pPr indent="-379730" lvl="0" marL="457200" rtl="0" algn="l">
               <a:spcBef>
                 <a:spcPts val="0"/>
               </a:spcBef>
@@ -6472,7 +6649,7 @@
             <a:endParaRPr/>
           </a:p>
           <a:p>
-            <a:pPr indent="-379730" lvl="0" marL="457200" rtl="0" algn="ctr">
+            <a:pPr indent="-379730" lvl="0" marL="457200" rtl="0" algn="l">
               <a:spcBef>
                 <a:spcPts val="0"/>
               </a:spcBef>
@@ -6489,7 +6666,7 @@
             <a:endParaRPr/>
           </a:p>
           <a:p>
-            <a:pPr indent="-379730" lvl="0" marL="457200" rtl="0" algn="ctr">
+            <a:pPr indent="-379730" lvl="0" marL="457200" rtl="0" algn="l">
               <a:spcBef>
                 <a:spcPts val="0"/>
               </a:spcBef>
@@ -6506,7 +6683,7 @@
             <a:endParaRPr/>
           </a:p>
           <a:p>
-            <a:pPr indent="-379730" lvl="0" marL="457200" rtl="0" algn="ctr">
+            <a:pPr indent="-379730" lvl="0" marL="457200" rtl="0" algn="l">
               <a:spcBef>
                 <a:spcPts val="0"/>
               </a:spcBef>
@@ -6523,7 +6700,7 @@
             <a:endParaRPr/>
           </a:p>
           <a:p>
-            <a:pPr indent="-379730" lvl="0" marL="457200" rtl="0" algn="ctr">
+            <a:pPr indent="-379730" lvl="0" marL="457200" rtl="0" algn="l">
               <a:spcBef>
                 <a:spcPts val="0"/>
               </a:spcBef>
@@ -6540,7 +6717,7 @@
             <a:endParaRPr/>
           </a:p>
           <a:p>
-            <a:pPr indent="-379730" lvl="0" marL="457200" rtl="0" algn="ctr">
+            <a:pPr indent="-379730" lvl="0" marL="457200" rtl="0" algn="l">
               <a:spcBef>
                 <a:spcPts val="0"/>
               </a:spcBef>
@@ -6555,6 +6732,101 @@
               <a:t>Each blog item in list has own url to blog post</a:t>
             </a:r>
             <a:endParaRPr/>
+          </a:p>
+        </p:txBody>
+      </p:sp>
+    </p:spTree>
+  </p:cSld>
+  <p:clrMapOvr>
+    <a:masterClrMapping/>
+  </p:clrMapOvr>
+</p:sld>
+</file>
+
+<file path=ppt/slides/slide6.xml><?xml version="1.0" encoding="utf-8"?>
+<p:sld xmlns:a="http://schemas.openxmlformats.org/drawingml/2006/main" xmlns:r="http://schemas.openxmlformats.org/officeDocument/2006/relationships" xmlns:mc="http://schemas.openxmlformats.org/markup-compatibility/2006" xmlns:mv="urn:schemas-microsoft-com:mac:vml" xmlns:p="http://schemas.openxmlformats.org/presentationml/2006/main" xmlns:c="http://schemas.openxmlformats.org/drawingml/2006/chart" xmlns:dgm="http://schemas.openxmlformats.org/drawingml/2006/diagram" xmlns:o="urn:schemas-microsoft-com:office:office" xmlns:v="urn:schemas-microsoft-com:vml" xmlns:pvml="urn:schemas-microsoft-com:office:powerpoint" xmlns:com="http://schemas.openxmlformats.org/drawingml/2006/compatibility" xmlns:p14="http://schemas.microsoft.com/office/powerpoint/2010/main" xmlns:p15="http://schemas.microsoft.com/office/powerpoint/2012/main" xmlns:ahyp="http://schemas.microsoft.com/office/drawing/2018/hyperlinkcolor">
+  <p:cSld>
+    <p:bg>
+      <p:bgPr>
+        <a:gradFill>
+          <a:gsLst>
+            <a:gs pos="0">
+              <a:srgbClr val="FFF6DB"/>
+            </a:gs>
+            <a:gs pos="100000">
+              <a:srgbClr val="FAD25C"/>
+            </a:gs>
+          </a:gsLst>
+          <a:lin ang="5400012" scaled="0"/>
+        </a:gradFill>
+      </p:bgPr>
+    </p:bg>
+    <p:spTree>
+      <p:nvGrpSpPr>
+        <p:cNvPr id="83" name="Shape 83"/>
+        <p:cNvGrpSpPr/>
+        <p:nvPr/>
+      </p:nvGrpSpPr>
+      <p:grpSpPr>
+        <a:xfrm>
+          <a:off x="0" y="0"/>
+          <a:ext cx="0" cy="0"/>
+          <a:chOff x="0" y="0"/>
+          <a:chExt cx="0" cy="0"/>
+        </a:xfrm>
+      </p:grpSpPr>
+      <p:sp>
+        <p:nvSpPr>
+          <p:cNvPr id="84" name="Google Shape;84;p18"/>
+          <p:cNvSpPr txBox="1"/>
+          <p:nvPr>
+            <p:ph type="ctrTitle"/>
+          </p:nvPr>
+        </p:nvSpPr>
+        <p:spPr>
+          <a:xfrm>
+            <a:off x="236258" y="1545450"/>
+            <a:ext cx="8520600" cy="2052600"/>
+          </a:xfrm>
+          <a:prstGeom prst="rect">
+            <a:avLst/>
+          </a:prstGeom>
+        </p:spPr>
+        <p:txBody>
+          <a:bodyPr anchorCtr="0" anchor="b" bIns="91425" lIns="91425" spcFirstLastPara="1" rIns="91425" wrap="square" tIns="91425">
+            <a:normAutofit fontScale="90000"/>
+          </a:bodyPr>
+          <a:lstStyle/>
+          <a:p>
+            <a:pPr indent="0" lvl="0" marL="0" rtl="0" algn="ctr">
+              <a:spcBef>
+                <a:spcPts val="0"/>
+              </a:spcBef>
+              <a:spcAft>
+                <a:spcPts val="0"/>
+              </a:spcAft>
+              <a:buNone/>
+            </a:pPr>
+            <a:r>
+              <a:rPr lang="en-GB" sz="4600"/>
+              <a:t>End of slide deck. Thank you for watching!</a:t>
+            </a:r>
+            <a:endParaRPr sz="4600"/>
+          </a:p>
+          <a:p>
+            <a:pPr indent="0" lvl="0" marL="0" rtl="0" algn="l">
+              <a:spcBef>
+                <a:spcPts val="0"/>
+              </a:spcBef>
+              <a:spcAft>
+                <a:spcPts val="0"/>
+              </a:spcAft>
+              <a:buNone/>
+            </a:pPr>
+            <a:r>
+              <a:t/>
+            </a:r>
+            <a:endParaRPr sz="4600"/>
           </a:p>
         </p:txBody>
       </p:sp>

</xml_diff>